<commit_message>
Slides: Adding additional first draft slides for questions 4/5/6
</commit_message>
<xml_diff>
--- a/Individual EDA/Andrew Y - Case Study 1 EDA.pptx
+++ b/Individual EDA/Andrew Y - Case Study 1 EDA.pptx
@@ -8,6 +8,9 @@
     <p:sldId id="271" r:id="rId2"/>
     <p:sldId id="258" r:id="rId3"/>
     <p:sldId id="272" r:id="rId4"/>
+    <p:sldId id="273" r:id="rId5"/>
+    <p:sldId id="274" r:id="rId6"/>
+    <p:sldId id="275" r:id="rId7"/>
   </p:sldIdLst>
   <p:sldSz cx="12192000" cy="6858000"/>
   <p:notesSz cx="6858000" cy="9144000"/>
@@ -3439,7 +3442,7 @@
           <a:p>
             <a:r>
               <a:rPr lang="en-US" sz="3600" b="1" dirty="0"/>
-              <a:t>Breweries present in each state</a:t>
+              <a:t>Breweries Present in Each State</a:t>
             </a:r>
             <a:endParaRPr lang="en-US" sz="3600" dirty="0"/>
           </a:p>
@@ -3643,7 +3646,11 @@
           <a:prstGeom prst="rightBrace">
             <a:avLst/>
           </a:prstGeom>
-          <a:ln w="28575"/>
+          <a:ln w="28575">
+            <a:solidFill>
+              <a:schemeClr val="tx1"/>
+            </a:solidFill>
+          </a:ln>
         </p:spPr>
         <p:style>
           <a:lnRef idx="1">
@@ -3826,7 +3833,7 @@
           <p:nvPr>
             <p:extLst>
               <p:ext uri="{D42A27DB-BD31-4B8C-83A1-F6EECF244321}">
-                <p14:modId xmlns:p14="http://schemas.microsoft.com/office/powerpoint/2010/main" val="1619810982"/>
+                <p14:modId xmlns:p14="http://schemas.microsoft.com/office/powerpoint/2010/main" val="930921348"/>
               </p:ext>
             </p:extLst>
           </p:nvPr>
@@ -3839,7 +3846,7 @@
           <a:graphicData uri="http://schemas.openxmlformats.org/drawingml/2006/table">
             <a:tbl>
               <a:tblPr firstRow="1" bandRow="1">
-                <a:tableStyleId>{5C22544A-7EE6-4342-B048-85BDC9FD1C3A}</a:tableStyleId>
+                <a:tableStyleId>{073A0DAA-6AF3-43AB-8588-CEC1D06C72B9}</a:tableStyleId>
               </a:tblPr>
               <a:tblGrid>
                 <a:gridCol w="822960">
@@ -4346,6 +4353,1006 @@
 </p:sld>
 </file>
 
+<file path=ppt/slides/slide4.xml><?xml version="1.0" encoding="utf-8"?>
+<p:sld xmlns:a="http://schemas.openxmlformats.org/drawingml/2006/main" xmlns:r="http://schemas.openxmlformats.org/officeDocument/2006/relationships" xmlns:p="http://schemas.openxmlformats.org/presentationml/2006/main">
+  <p:cSld>
+    <p:spTree>
+      <p:nvGrpSpPr>
+        <p:cNvPr id="1" name=""/>
+        <p:cNvGrpSpPr/>
+        <p:nvPr/>
+      </p:nvGrpSpPr>
+      <p:grpSpPr>
+        <a:xfrm>
+          <a:off x="0" y="0"/>
+          <a:ext cx="0" cy="0"/>
+          <a:chOff x="0" y="0"/>
+          <a:chExt cx="0" cy="0"/>
+        </a:xfrm>
+      </p:grpSpPr>
+      <p:sp>
+        <p:nvSpPr>
+          <p:cNvPr id="2" name="Title 1">
+            <a:extLst>
+              <a:ext uri="{FF2B5EF4-FFF2-40B4-BE49-F238E27FC236}">
+                <a16:creationId xmlns:a16="http://schemas.microsoft.com/office/drawing/2014/main" id="{6031D06A-2D44-1848-9E47-6AEC110C0F05}"/>
+              </a:ext>
+            </a:extLst>
+          </p:cNvPr>
+          <p:cNvSpPr>
+            <a:spLocks noGrp="1"/>
+          </p:cNvSpPr>
+          <p:nvPr>
+            <p:ph type="title"/>
+          </p:nvPr>
+        </p:nvSpPr>
+        <p:spPr/>
+        <p:txBody>
+          <a:bodyPr>
+            <a:normAutofit/>
+          </a:bodyPr>
+          <a:lstStyle/>
+          <a:p>
+            <a:r>
+              <a:rPr lang="en-US" sz="3600" b="1" dirty="0"/>
+              <a:t>Median ABV and IBU by State</a:t>
+            </a:r>
+            <a:endParaRPr lang="en-US" sz="3600" dirty="0"/>
+          </a:p>
+        </p:txBody>
+      </p:sp>
+      <p:pic>
+        <p:nvPicPr>
+          <p:cNvPr id="4" name="Picture 3">
+            <a:extLst>
+              <a:ext uri="{FF2B5EF4-FFF2-40B4-BE49-F238E27FC236}">
+                <a16:creationId xmlns:a16="http://schemas.microsoft.com/office/drawing/2014/main" id="{43CDED60-6122-1C70-4AD3-54817C9A76CF}"/>
+              </a:ext>
+            </a:extLst>
+          </p:cNvPr>
+          <p:cNvPicPr>
+            <a:picLocks noChangeAspect="1"/>
+          </p:cNvPicPr>
+          <p:nvPr/>
+        </p:nvPicPr>
+        <p:blipFill>
+          <a:blip r:embed="rId2"/>
+          <a:stretch>
+            <a:fillRect/>
+          </a:stretch>
+        </p:blipFill>
+        <p:spPr>
+          <a:xfrm>
+            <a:off x="838200" y="1690688"/>
+            <a:ext cx="9235891" cy="4262719"/>
+          </a:xfrm>
+          <a:prstGeom prst="rect">
+            <a:avLst/>
+          </a:prstGeom>
+        </p:spPr>
+      </p:pic>
+      <p:sp>
+        <p:nvSpPr>
+          <p:cNvPr id="6" name="TextBox 5">
+            <a:extLst>
+              <a:ext uri="{FF2B5EF4-FFF2-40B4-BE49-F238E27FC236}">
+                <a16:creationId xmlns:a16="http://schemas.microsoft.com/office/drawing/2014/main" id="{FE23C3E8-DDC4-7CE7-83FF-A029EF7CB292}"/>
+              </a:ext>
+            </a:extLst>
+          </p:cNvPr>
+          <p:cNvSpPr txBox="1"/>
+          <p:nvPr/>
+        </p:nvSpPr>
+        <p:spPr>
+          <a:xfrm>
+            <a:off x="10074091" y="1690688"/>
+            <a:ext cx="1987921" cy="923330"/>
+          </a:xfrm>
+          <a:prstGeom prst="rect">
+            <a:avLst/>
+          </a:prstGeom>
+          <a:noFill/>
+        </p:spPr>
+        <p:txBody>
+          <a:bodyPr wrap="square" rtlCol="0">
+            <a:spAutoFit/>
+          </a:bodyPr>
+          <a:lstStyle/>
+          <a:p>
+            <a:r>
+              <a:rPr lang="en-US" u="sng" dirty="0"/>
+              <a:t>Median ABV</a:t>
+            </a:r>
+          </a:p>
+          <a:p>
+            <a:r>
+              <a:rPr lang="en-US" dirty="0"/>
+              <a:t>Min = 0.04</a:t>
+            </a:r>
+          </a:p>
+          <a:p>
+            <a:r>
+              <a:rPr lang="en-US" dirty="0"/>
+              <a:t>Max = 0.0625</a:t>
+            </a:r>
+          </a:p>
+        </p:txBody>
+      </p:sp>
+      <p:sp>
+        <p:nvSpPr>
+          <p:cNvPr id="7" name="TextBox 6">
+            <a:extLst>
+              <a:ext uri="{FF2B5EF4-FFF2-40B4-BE49-F238E27FC236}">
+                <a16:creationId xmlns:a16="http://schemas.microsoft.com/office/drawing/2014/main" id="{ABEC8484-EFC2-2293-E876-49EF21999291}"/>
+              </a:ext>
+            </a:extLst>
+          </p:cNvPr>
+          <p:cNvSpPr txBox="1"/>
+          <p:nvPr/>
+        </p:nvSpPr>
+        <p:spPr>
+          <a:xfrm>
+            <a:off x="10074091" y="3916177"/>
+            <a:ext cx="1987921" cy="923330"/>
+          </a:xfrm>
+          <a:prstGeom prst="rect">
+            <a:avLst/>
+          </a:prstGeom>
+          <a:noFill/>
+        </p:spPr>
+        <p:txBody>
+          <a:bodyPr wrap="square" rtlCol="0">
+            <a:spAutoFit/>
+          </a:bodyPr>
+          <a:lstStyle/>
+          <a:p>
+            <a:r>
+              <a:rPr lang="en-US" u="sng" dirty="0"/>
+              <a:t>Median IBU</a:t>
+            </a:r>
+          </a:p>
+          <a:p>
+            <a:r>
+              <a:rPr lang="en-US" dirty="0"/>
+              <a:t>Min = 19</a:t>
+            </a:r>
+          </a:p>
+          <a:p>
+            <a:r>
+              <a:rPr lang="en-US" dirty="0"/>
+              <a:t>Max = 61</a:t>
+            </a:r>
+          </a:p>
+        </p:txBody>
+      </p:sp>
+    </p:spTree>
+    <p:extLst>
+      <p:ext uri="{BB962C8B-B14F-4D97-AF65-F5344CB8AC3E}">
+        <p14:creationId xmlns:p14="http://schemas.microsoft.com/office/powerpoint/2010/main" val="1345929699"/>
+      </p:ext>
+    </p:extLst>
+  </p:cSld>
+  <p:clrMapOvr>
+    <a:masterClrMapping/>
+  </p:clrMapOvr>
+</p:sld>
+</file>
+
+<file path=ppt/slides/slide5.xml><?xml version="1.0" encoding="utf-8"?>
+<p:sld xmlns:a="http://schemas.openxmlformats.org/drawingml/2006/main" xmlns:r="http://schemas.openxmlformats.org/officeDocument/2006/relationships" xmlns:p="http://schemas.openxmlformats.org/presentationml/2006/main">
+  <p:cSld>
+    <p:spTree>
+      <p:nvGrpSpPr>
+        <p:cNvPr id="1" name=""/>
+        <p:cNvGrpSpPr/>
+        <p:nvPr/>
+      </p:nvGrpSpPr>
+      <p:grpSpPr>
+        <a:xfrm>
+          <a:off x="0" y="0"/>
+          <a:ext cx="0" cy="0"/>
+          <a:chOff x="0" y="0"/>
+          <a:chExt cx="0" cy="0"/>
+        </a:xfrm>
+      </p:grpSpPr>
+      <p:sp>
+        <p:nvSpPr>
+          <p:cNvPr id="2" name="Title 1">
+            <a:extLst>
+              <a:ext uri="{FF2B5EF4-FFF2-40B4-BE49-F238E27FC236}">
+                <a16:creationId xmlns:a16="http://schemas.microsoft.com/office/drawing/2014/main" id="{6031D06A-2D44-1848-9E47-6AEC110C0F05}"/>
+              </a:ext>
+            </a:extLst>
+          </p:cNvPr>
+          <p:cNvSpPr>
+            <a:spLocks noGrp="1"/>
+          </p:cNvSpPr>
+          <p:nvPr>
+            <p:ph type="title"/>
+          </p:nvPr>
+        </p:nvSpPr>
+        <p:spPr/>
+        <p:txBody>
+          <a:bodyPr>
+            <a:normAutofit/>
+          </a:bodyPr>
+          <a:lstStyle/>
+          <a:p>
+            <a:r>
+              <a:rPr lang="en-US" sz="3600" b="1" dirty="0"/>
+              <a:t>Maximum ABV and IBU</a:t>
+            </a:r>
+            <a:endParaRPr lang="en-US" sz="3600" dirty="0"/>
+          </a:p>
+        </p:txBody>
+      </p:sp>
+      <p:sp>
+        <p:nvSpPr>
+          <p:cNvPr id="6" name="TextBox 5">
+            <a:extLst>
+              <a:ext uri="{FF2B5EF4-FFF2-40B4-BE49-F238E27FC236}">
+                <a16:creationId xmlns:a16="http://schemas.microsoft.com/office/drawing/2014/main" id="{FE23C3E8-DDC4-7CE7-83FF-A029EF7CB292}"/>
+              </a:ext>
+            </a:extLst>
+          </p:cNvPr>
+          <p:cNvSpPr txBox="1"/>
+          <p:nvPr/>
+        </p:nvSpPr>
+        <p:spPr>
+          <a:xfrm>
+            <a:off x="838200" y="1690688"/>
+            <a:ext cx="4970929" cy="1477328"/>
+          </a:xfrm>
+          <a:prstGeom prst="rect">
+            <a:avLst/>
+          </a:prstGeom>
+          <a:noFill/>
+        </p:spPr>
+        <p:txBody>
+          <a:bodyPr wrap="square" rtlCol="0">
+            <a:spAutoFit/>
+          </a:bodyPr>
+          <a:lstStyle/>
+          <a:p>
+            <a:r>
+              <a:rPr lang="en-US" u="sng" dirty="0"/>
+              <a:t>Max Overall ABV</a:t>
+            </a:r>
+          </a:p>
+          <a:p>
+            <a:r>
+              <a:rPr lang="en-US" dirty="0"/>
+              <a:t>Lee Hill Series Vol. 5 - Belgian Style </a:t>
+            </a:r>
+            <a:r>
+              <a:rPr lang="en-US" dirty="0" err="1"/>
+              <a:t>Quadrupel</a:t>
+            </a:r>
+            <a:r>
+              <a:rPr lang="en-US" dirty="0"/>
+              <a:t> Ale</a:t>
+            </a:r>
+          </a:p>
+          <a:p>
+            <a:r>
+              <a:rPr lang="en-US" dirty="0"/>
+              <a:t>Upslope Brewing Company</a:t>
+            </a:r>
+          </a:p>
+          <a:p>
+            <a:r>
+              <a:rPr lang="en-US" dirty="0"/>
+              <a:t>Colorado</a:t>
+            </a:r>
+          </a:p>
+          <a:p>
+            <a:r>
+              <a:rPr lang="en-US" b="1" dirty="0"/>
+              <a:t>ABV = 0.128</a:t>
+            </a:r>
+          </a:p>
+        </p:txBody>
+      </p:sp>
+      <p:sp>
+        <p:nvSpPr>
+          <p:cNvPr id="7" name="TextBox 6">
+            <a:extLst>
+              <a:ext uri="{FF2B5EF4-FFF2-40B4-BE49-F238E27FC236}">
+                <a16:creationId xmlns:a16="http://schemas.microsoft.com/office/drawing/2014/main" id="{ABEC8484-EFC2-2293-E876-49EF21999291}"/>
+              </a:ext>
+            </a:extLst>
+          </p:cNvPr>
+          <p:cNvSpPr txBox="1"/>
+          <p:nvPr/>
+        </p:nvSpPr>
+        <p:spPr>
+          <a:xfrm>
+            <a:off x="7014882" y="1690687"/>
+            <a:ext cx="4970928" cy="1477328"/>
+          </a:xfrm>
+          <a:prstGeom prst="rect">
+            <a:avLst/>
+          </a:prstGeom>
+          <a:noFill/>
+        </p:spPr>
+        <p:txBody>
+          <a:bodyPr wrap="square" rtlCol="0">
+            <a:spAutoFit/>
+          </a:bodyPr>
+          <a:lstStyle/>
+          <a:p>
+            <a:r>
+              <a:rPr lang="en-US" u="sng" dirty="0"/>
+              <a:t>Max Overall IBU</a:t>
+            </a:r>
+          </a:p>
+          <a:p>
+            <a:r>
+              <a:rPr lang="en-US" dirty="0"/>
+              <a:t>Bitter B*tch Imperial IPA</a:t>
+            </a:r>
+          </a:p>
+          <a:p>
+            <a:r>
+              <a:rPr lang="en-US" dirty="0"/>
+              <a:t>Astoria Brewing Company</a:t>
+            </a:r>
+          </a:p>
+          <a:p>
+            <a:r>
+              <a:rPr lang="en-US" dirty="0"/>
+              <a:t>Oregon</a:t>
+            </a:r>
+          </a:p>
+          <a:p>
+            <a:r>
+              <a:rPr lang="en-US" b="1" dirty="0"/>
+              <a:t>IBU = 138</a:t>
+            </a:r>
+          </a:p>
+        </p:txBody>
+      </p:sp>
+      <p:pic>
+        <p:nvPicPr>
+          <p:cNvPr id="8" name="Picture 2" descr="upslope_lee_hell_5">
+            <a:extLst>
+              <a:ext uri="{FF2B5EF4-FFF2-40B4-BE49-F238E27FC236}">
+                <a16:creationId xmlns:a16="http://schemas.microsoft.com/office/drawing/2014/main" id="{52085378-6A23-1F19-1823-CC05A94216BE}"/>
+              </a:ext>
+            </a:extLst>
+          </p:cNvPr>
+          <p:cNvPicPr>
+            <a:picLocks noChangeAspect="1" noChangeArrowheads="1"/>
+          </p:cNvPicPr>
+          <p:nvPr/>
+        </p:nvPicPr>
+        <p:blipFill>
+          <a:blip r:embed="rId2">
+            <a:extLst>
+              <a:ext uri="{28A0092B-C50C-407E-A947-70E740481C1C}">
+                <a14:useLocalDpi xmlns:a14="http://schemas.microsoft.com/office/drawing/2010/main" val="0"/>
+              </a:ext>
+            </a:extLst>
+          </a:blip>
+          <a:srcRect/>
+          <a:stretch>
+            <a:fillRect/>
+          </a:stretch>
+        </p:blipFill>
+        <p:spPr bwMode="auto">
+          <a:xfrm>
+            <a:off x="838200" y="3429000"/>
+            <a:ext cx="1138518" cy="3252295"/>
+          </a:xfrm>
+          <a:prstGeom prst="rect">
+            <a:avLst/>
+          </a:prstGeom>
+          <a:noFill/>
+          <a:ln>
+            <a:noFill/>
+          </a:ln>
+          <a:extLst>
+            <a:ext uri="{909E8E84-426E-40DD-AFC4-6F175D3DCCD1}">
+              <a14:hiddenFill xmlns:a14="http://schemas.microsoft.com/office/drawing/2010/main">
+                <a:solidFill>
+                  <a:srgbClr val="FFFFFF"/>
+                </a:solidFill>
+              </a14:hiddenFill>
+            </a:ext>
+            <a:ext uri="{91240B29-F687-4F45-9708-019B960494DF}">
+              <a14:hiddenLine xmlns:a14="http://schemas.microsoft.com/office/drawing/2010/main" w="9525">
+                <a:solidFill>
+                  <a:srgbClr val="000000"/>
+                </a:solidFill>
+                <a:miter lim="800000"/>
+                <a:headEnd/>
+                <a:tailEnd/>
+              </a14:hiddenLine>
+            </a:ext>
+          </a:extLst>
+        </p:spPr>
+      </p:pic>
+      <p:pic>
+        <p:nvPicPr>
+          <p:cNvPr id="1026" name="Picture 2" descr="Astoria Brewing Company Tap Room | Breweries &amp; Bars">
+            <a:extLst>
+              <a:ext uri="{FF2B5EF4-FFF2-40B4-BE49-F238E27FC236}">
+                <a16:creationId xmlns:a16="http://schemas.microsoft.com/office/drawing/2014/main" id="{64F53315-A855-561B-53C8-69D6C97913C1}"/>
+              </a:ext>
+            </a:extLst>
+          </p:cNvPr>
+          <p:cNvPicPr>
+            <a:picLocks noChangeAspect="1" noChangeArrowheads="1"/>
+          </p:cNvPicPr>
+          <p:nvPr/>
+        </p:nvPicPr>
+        <p:blipFill>
+          <a:blip r:embed="rId3">
+            <a:extLst>
+              <a:ext uri="{28A0092B-C50C-407E-A947-70E740481C1C}">
+                <a14:useLocalDpi xmlns:a14="http://schemas.microsoft.com/office/drawing/2010/main" val="0"/>
+              </a:ext>
+            </a:extLst>
+          </a:blip>
+          <a:srcRect/>
+          <a:stretch>
+            <a:fillRect/>
+          </a:stretch>
+        </p:blipFill>
+        <p:spPr bwMode="auto">
+          <a:xfrm>
+            <a:off x="7014882" y="3429000"/>
+            <a:ext cx="2711450" cy="3175000"/>
+          </a:xfrm>
+          <a:prstGeom prst="rect">
+            <a:avLst/>
+          </a:prstGeom>
+          <a:noFill/>
+          <a:extLst>
+            <a:ext uri="{909E8E84-426E-40DD-AFC4-6F175D3DCCD1}">
+              <a14:hiddenFill xmlns:a14="http://schemas.microsoft.com/office/drawing/2010/main">
+                <a:solidFill>
+                  <a:srgbClr val="FFFFFF"/>
+                </a:solidFill>
+              </a14:hiddenFill>
+            </a:ext>
+          </a:extLst>
+        </p:spPr>
+      </p:pic>
+    </p:spTree>
+    <p:extLst>
+      <p:ext uri="{BB962C8B-B14F-4D97-AF65-F5344CB8AC3E}">
+        <p14:creationId xmlns:p14="http://schemas.microsoft.com/office/powerpoint/2010/main" val="954462846"/>
+      </p:ext>
+    </p:extLst>
+  </p:cSld>
+  <p:clrMapOvr>
+    <a:masterClrMapping/>
+  </p:clrMapOvr>
+</p:sld>
+</file>
+
+<file path=ppt/slides/slide6.xml><?xml version="1.0" encoding="utf-8"?>
+<p:sld xmlns:a="http://schemas.openxmlformats.org/drawingml/2006/main" xmlns:r="http://schemas.openxmlformats.org/officeDocument/2006/relationships" xmlns:p="http://schemas.openxmlformats.org/presentationml/2006/main">
+  <p:cSld>
+    <p:spTree>
+      <p:nvGrpSpPr>
+        <p:cNvPr id="1" name=""/>
+        <p:cNvGrpSpPr/>
+        <p:nvPr/>
+      </p:nvGrpSpPr>
+      <p:grpSpPr>
+        <a:xfrm>
+          <a:off x="0" y="0"/>
+          <a:ext cx="0" cy="0"/>
+          <a:chOff x="0" y="0"/>
+          <a:chExt cx="0" cy="0"/>
+        </a:xfrm>
+      </p:grpSpPr>
+      <p:sp>
+        <p:nvSpPr>
+          <p:cNvPr id="2" name="Title 1">
+            <a:extLst>
+              <a:ext uri="{FF2B5EF4-FFF2-40B4-BE49-F238E27FC236}">
+                <a16:creationId xmlns:a16="http://schemas.microsoft.com/office/drawing/2014/main" id="{6031D06A-2D44-1848-9E47-6AEC110C0F05}"/>
+              </a:ext>
+            </a:extLst>
+          </p:cNvPr>
+          <p:cNvSpPr>
+            <a:spLocks noGrp="1"/>
+          </p:cNvSpPr>
+          <p:nvPr>
+            <p:ph type="title"/>
+          </p:nvPr>
+        </p:nvSpPr>
+        <p:spPr/>
+        <p:txBody>
+          <a:bodyPr>
+            <a:normAutofit/>
+          </a:bodyPr>
+          <a:lstStyle/>
+          <a:p>
+            <a:r>
+              <a:rPr lang="en-US" sz="3600" b="1" dirty="0"/>
+              <a:t>Distribution of ABV</a:t>
+            </a:r>
+            <a:endParaRPr lang="en-US" sz="3600" dirty="0"/>
+          </a:p>
+        </p:txBody>
+      </p:sp>
+      <p:graphicFrame>
+        <p:nvGraphicFramePr>
+          <p:cNvPr id="5" name="Table 5">
+            <a:extLst>
+              <a:ext uri="{FF2B5EF4-FFF2-40B4-BE49-F238E27FC236}">
+                <a16:creationId xmlns:a16="http://schemas.microsoft.com/office/drawing/2014/main" id="{7B0380DE-C735-A9AD-1689-DB6202AB482B}"/>
+              </a:ext>
+            </a:extLst>
+          </p:cNvPr>
+          <p:cNvGraphicFramePr>
+            <a:graphicFrameLocks noGrp="1"/>
+          </p:cNvGraphicFramePr>
+          <p:nvPr>
+            <p:extLst>
+              <p:ext uri="{D42A27DB-BD31-4B8C-83A1-F6EECF244321}">
+                <p14:modId xmlns:p14="http://schemas.microsoft.com/office/powerpoint/2010/main" val="1434830923"/>
+              </p:ext>
+            </p:extLst>
+          </p:nvPr>
+        </p:nvGraphicFramePr>
+        <p:xfrm>
+          <a:off x="7020859" y="2131060"/>
+          <a:ext cx="4937760" cy="2595880"/>
+        </p:xfrm>
+        <a:graphic>
+          <a:graphicData uri="http://schemas.openxmlformats.org/drawingml/2006/table">
+            <a:tbl>
+              <a:tblPr firstRow="1" bandRow="1">
+                <a:tableStyleId>{073A0DAA-6AF3-43AB-8588-CEC1D06C72B9}</a:tableStyleId>
+              </a:tblPr>
+              <a:tblGrid>
+                <a:gridCol w="2468880">
+                  <a:extLst>
+                    <a:ext uri="{9D8B030D-6E8A-4147-A177-3AD203B41FA5}">
+                      <a16:colId xmlns:a16="http://schemas.microsoft.com/office/drawing/2014/main" val="4198213525"/>
+                    </a:ext>
+                  </a:extLst>
+                </a:gridCol>
+                <a:gridCol w="2468880">
+                  <a:extLst>
+                    <a:ext uri="{9D8B030D-6E8A-4147-A177-3AD203B41FA5}">
+                      <a16:colId xmlns:a16="http://schemas.microsoft.com/office/drawing/2014/main" val="201747132"/>
+                    </a:ext>
+                  </a:extLst>
+                </a:gridCol>
+              </a:tblGrid>
+              <a:tr h="370840">
+                <a:tc>
+                  <a:txBody>
+                    <a:bodyPr/>
+                    <a:lstStyle/>
+                    <a:p>
+                      <a:pPr algn="ctr"/>
+                      <a:r>
+                        <a:rPr lang="en-US" dirty="0"/>
+                        <a:t>Parameter</a:t>
+                      </a:r>
+                    </a:p>
+                  </a:txBody>
+                  <a:tcPr/>
+                </a:tc>
+                <a:tc>
+                  <a:txBody>
+                    <a:bodyPr/>
+                    <a:lstStyle/>
+                    <a:p>
+                      <a:pPr algn="ctr"/>
+                      <a:r>
+                        <a:rPr lang="en-US" dirty="0"/>
+                        <a:t>Value</a:t>
+                      </a:r>
+                    </a:p>
+                  </a:txBody>
+                  <a:tcPr/>
+                </a:tc>
+                <a:extLst>
+                  <a:ext uri="{0D108BD9-81ED-4DB2-BD59-A6C34878D82A}">
+                    <a16:rowId xmlns:a16="http://schemas.microsoft.com/office/drawing/2014/main" val="281196206"/>
+                  </a:ext>
+                </a:extLst>
+              </a:tr>
+              <a:tr h="370840">
+                <a:tc>
+                  <a:txBody>
+                    <a:bodyPr/>
+                    <a:lstStyle/>
+                    <a:p>
+                      <a:pPr algn="ctr"/>
+                      <a:r>
+                        <a:rPr lang="en-US" dirty="0"/>
+                        <a:t>Minimum</a:t>
+                      </a:r>
+                    </a:p>
+                  </a:txBody>
+                  <a:tcPr/>
+                </a:tc>
+                <a:tc>
+                  <a:txBody>
+                    <a:bodyPr/>
+                    <a:lstStyle/>
+                    <a:p>
+                      <a:pPr algn="ctr"/>
+                      <a:r>
+                        <a:rPr lang="en-US" dirty="0"/>
+                        <a:t>0.001</a:t>
+                      </a:r>
+                    </a:p>
+                  </a:txBody>
+                  <a:tcPr/>
+                </a:tc>
+                <a:extLst>
+                  <a:ext uri="{0D108BD9-81ED-4DB2-BD59-A6C34878D82A}">
+                    <a16:rowId xmlns:a16="http://schemas.microsoft.com/office/drawing/2014/main" val="417393779"/>
+                  </a:ext>
+                </a:extLst>
+              </a:tr>
+              <a:tr h="370840">
+                <a:tc>
+                  <a:txBody>
+                    <a:bodyPr/>
+                    <a:lstStyle/>
+                    <a:p>
+                      <a:pPr algn="ctr"/>
+                      <a:r>
+                        <a:rPr lang="en-US" dirty="0"/>
+                        <a:t>1</a:t>
+                      </a:r>
+                      <a:r>
+                        <a:rPr lang="en-US" baseline="30000" dirty="0"/>
+                        <a:t>st</a:t>
+                      </a:r>
+                      <a:r>
+                        <a:rPr lang="en-US" dirty="0"/>
+                        <a:t> Quartile</a:t>
+                      </a:r>
+                    </a:p>
+                  </a:txBody>
+                  <a:tcPr/>
+                </a:tc>
+                <a:tc>
+                  <a:txBody>
+                    <a:bodyPr/>
+                    <a:lstStyle/>
+                    <a:p>
+                      <a:pPr algn="ctr"/>
+                      <a:r>
+                        <a:rPr lang="en-US" dirty="0"/>
+                        <a:t>0.050</a:t>
+                      </a:r>
+                    </a:p>
+                  </a:txBody>
+                  <a:tcPr/>
+                </a:tc>
+                <a:extLst>
+                  <a:ext uri="{0D108BD9-81ED-4DB2-BD59-A6C34878D82A}">
+                    <a16:rowId xmlns:a16="http://schemas.microsoft.com/office/drawing/2014/main" val="815494044"/>
+                  </a:ext>
+                </a:extLst>
+              </a:tr>
+              <a:tr h="370840">
+                <a:tc>
+                  <a:txBody>
+                    <a:bodyPr/>
+                    <a:lstStyle/>
+                    <a:p>
+                      <a:pPr algn="ctr"/>
+                      <a:r>
+                        <a:rPr lang="en-US" dirty="0"/>
+                        <a:t>Median</a:t>
+                      </a:r>
+                    </a:p>
+                  </a:txBody>
+                  <a:tcPr/>
+                </a:tc>
+                <a:tc>
+                  <a:txBody>
+                    <a:bodyPr/>
+                    <a:lstStyle/>
+                    <a:p>
+                      <a:pPr algn="ctr"/>
+                      <a:r>
+                        <a:rPr lang="en-US" dirty="0"/>
+                        <a:t>0.056</a:t>
+                      </a:r>
+                    </a:p>
+                  </a:txBody>
+                  <a:tcPr/>
+                </a:tc>
+                <a:extLst>
+                  <a:ext uri="{0D108BD9-81ED-4DB2-BD59-A6C34878D82A}">
+                    <a16:rowId xmlns:a16="http://schemas.microsoft.com/office/drawing/2014/main" val="4179465921"/>
+                  </a:ext>
+                </a:extLst>
+              </a:tr>
+              <a:tr h="370840">
+                <a:tc>
+                  <a:txBody>
+                    <a:bodyPr/>
+                    <a:lstStyle/>
+                    <a:p>
+                      <a:pPr algn="ctr"/>
+                      <a:r>
+                        <a:rPr lang="en-US" dirty="0"/>
+                        <a:t>Mean</a:t>
+                      </a:r>
+                    </a:p>
+                  </a:txBody>
+                  <a:tcPr/>
+                </a:tc>
+                <a:tc>
+                  <a:txBody>
+                    <a:bodyPr/>
+                    <a:lstStyle/>
+                    <a:p>
+                      <a:pPr algn="ctr"/>
+                      <a:r>
+                        <a:rPr lang="en-US" dirty="0"/>
+                        <a:t>0.059</a:t>
+                      </a:r>
+                    </a:p>
+                  </a:txBody>
+                  <a:tcPr/>
+                </a:tc>
+                <a:extLst>
+                  <a:ext uri="{0D108BD9-81ED-4DB2-BD59-A6C34878D82A}">
+                    <a16:rowId xmlns:a16="http://schemas.microsoft.com/office/drawing/2014/main" val="2320804492"/>
+                  </a:ext>
+                </a:extLst>
+              </a:tr>
+              <a:tr h="370840">
+                <a:tc>
+                  <a:txBody>
+                    <a:bodyPr/>
+                    <a:lstStyle/>
+                    <a:p>
+                      <a:pPr algn="ctr"/>
+                      <a:r>
+                        <a:rPr lang="en-US" dirty="0"/>
+                        <a:t>3</a:t>
+                      </a:r>
+                      <a:r>
+                        <a:rPr lang="en-US" baseline="30000" dirty="0"/>
+                        <a:t>rd</a:t>
+                      </a:r>
+                      <a:r>
+                        <a:rPr lang="en-US" dirty="0"/>
+                        <a:t> Quartile</a:t>
+                      </a:r>
+                    </a:p>
+                  </a:txBody>
+                  <a:tcPr/>
+                </a:tc>
+                <a:tc>
+                  <a:txBody>
+                    <a:bodyPr/>
+                    <a:lstStyle/>
+                    <a:p>
+                      <a:pPr algn="ctr"/>
+                      <a:r>
+                        <a:rPr lang="en-US" dirty="0"/>
+                        <a:t>0.067</a:t>
+                      </a:r>
+                    </a:p>
+                  </a:txBody>
+                  <a:tcPr/>
+                </a:tc>
+                <a:extLst>
+                  <a:ext uri="{0D108BD9-81ED-4DB2-BD59-A6C34878D82A}">
+                    <a16:rowId xmlns:a16="http://schemas.microsoft.com/office/drawing/2014/main" val="1816393163"/>
+                  </a:ext>
+                </a:extLst>
+              </a:tr>
+              <a:tr h="370840">
+                <a:tc>
+                  <a:txBody>
+                    <a:bodyPr/>
+                    <a:lstStyle/>
+                    <a:p>
+                      <a:pPr algn="ctr"/>
+                      <a:r>
+                        <a:rPr lang="en-US" dirty="0"/>
+                        <a:t>Max</a:t>
+                      </a:r>
+                    </a:p>
+                  </a:txBody>
+                  <a:tcPr/>
+                </a:tc>
+                <a:tc>
+                  <a:txBody>
+                    <a:bodyPr/>
+                    <a:lstStyle/>
+                    <a:p>
+                      <a:pPr algn="ctr"/>
+                      <a:r>
+                        <a:rPr lang="en-US" dirty="0"/>
+                        <a:t>0.128</a:t>
+                      </a:r>
+                    </a:p>
+                  </a:txBody>
+                  <a:tcPr/>
+                </a:tc>
+                <a:extLst>
+                  <a:ext uri="{0D108BD9-81ED-4DB2-BD59-A6C34878D82A}">
+                    <a16:rowId xmlns:a16="http://schemas.microsoft.com/office/drawing/2014/main" val="2733491562"/>
+                  </a:ext>
+                </a:extLst>
+              </a:tr>
+            </a:tbl>
+          </a:graphicData>
+        </a:graphic>
+      </p:graphicFrame>
+      <p:pic>
+        <p:nvPicPr>
+          <p:cNvPr id="6" name="Picture 5">
+            <a:extLst>
+              <a:ext uri="{FF2B5EF4-FFF2-40B4-BE49-F238E27FC236}">
+                <a16:creationId xmlns:a16="http://schemas.microsoft.com/office/drawing/2014/main" id="{0AF966DB-8D0E-5BDD-DF30-12AAB41455B4}"/>
+              </a:ext>
+            </a:extLst>
+          </p:cNvPr>
+          <p:cNvPicPr>
+            <a:picLocks noChangeAspect="1"/>
+          </p:cNvPicPr>
+          <p:nvPr/>
+        </p:nvPicPr>
+        <p:blipFill>
+          <a:blip r:embed="rId2"/>
+          <a:srcRect/>
+          <a:stretch/>
+        </p:blipFill>
+        <p:spPr>
+          <a:xfrm>
+            <a:off x="407147" y="1862118"/>
+            <a:ext cx="6155016" cy="3936711"/>
+          </a:xfrm>
+          <a:prstGeom prst="rect">
+            <a:avLst/>
+          </a:prstGeom>
+        </p:spPr>
+      </p:pic>
+      <p:sp>
+        <p:nvSpPr>
+          <p:cNvPr id="7" name="Right Brace 6">
+            <a:extLst>
+              <a:ext uri="{FF2B5EF4-FFF2-40B4-BE49-F238E27FC236}">
+                <a16:creationId xmlns:a16="http://schemas.microsoft.com/office/drawing/2014/main" id="{AD4C8BCC-30C8-B072-D882-420156D85B5B}"/>
+              </a:ext>
+            </a:extLst>
+          </p:cNvPr>
+          <p:cNvSpPr/>
+          <p:nvPr/>
+        </p:nvSpPr>
+        <p:spPr>
+          <a:xfrm rot="16200000">
+            <a:off x="5183841" y="3812538"/>
+            <a:ext cx="389965" cy="1694329"/>
+          </a:xfrm>
+          <a:prstGeom prst="rightBrace">
+            <a:avLst/>
+          </a:prstGeom>
+          <a:ln w="28575">
+            <a:solidFill>
+              <a:schemeClr val="tx1"/>
+            </a:solidFill>
+          </a:ln>
+        </p:spPr>
+        <p:style>
+          <a:lnRef idx="1">
+            <a:schemeClr val="accent1"/>
+          </a:lnRef>
+          <a:fillRef idx="0">
+            <a:schemeClr val="accent1"/>
+          </a:fillRef>
+          <a:effectRef idx="0">
+            <a:schemeClr val="accent1"/>
+          </a:effectRef>
+          <a:fontRef idx="minor">
+            <a:schemeClr val="tx1"/>
+          </a:fontRef>
+        </p:style>
+        <p:txBody>
+          <a:bodyPr rtlCol="0" anchor="ctr"/>
+          <a:lstStyle/>
+          <a:p>
+            <a:pPr algn="ctr"/>
+            <a:endParaRPr lang="en-US"/>
+          </a:p>
+        </p:txBody>
+      </p:sp>
+      <p:sp>
+        <p:nvSpPr>
+          <p:cNvPr id="10" name="TextBox 9">
+            <a:extLst>
+              <a:ext uri="{FF2B5EF4-FFF2-40B4-BE49-F238E27FC236}">
+                <a16:creationId xmlns:a16="http://schemas.microsoft.com/office/drawing/2014/main" id="{AE0DC725-60E2-6321-E69A-01FCB0EDA38E}"/>
+              </a:ext>
+            </a:extLst>
+          </p:cNvPr>
+          <p:cNvSpPr txBox="1"/>
+          <p:nvPr/>
+        </p:nvSpPr>
+        <p:spPr>
+          <a:xfrm>
+            <a:off x="4211170" y="3818388"/>
+            <a:ext cx="2335305" cy="646331"/>
+          </a:xfrm>
+          <a:prstGeom prst="rect">
+            <a:avLst/>
+          </a:prstGeom>
+          <a:noFill/>
+        </p:spPr>
+        <p:txBody>
+          <a:bodyPr wrap="square" rtlCol="0">
+            <a:spAutoFit/>
+          </a:bodyPr>
+          <a:lstStyle/>
+          <a:p>
+            <a:pPr algn="ctr"/>
+            <a:r>
+              <a:rPr lang="en-US" dirty="0"/>
+              <a:t>Distribution is right skewed</a:t>
+            </a:r>
+          </a:p>
+        </p:txBody>
+      </p:sp>
+      <p:sp>
+        <p:nvSpPr>
+          <p:cNvPr id="12" name="TextBox 11">
+            <a:extLst>
+              <a:ext uri="{FF2B5EF4-FFF2-40B4-BE49-F238E27FC236}">
+                <a16:creationId xmlns:a16="http://schemas.microsoft.com/office/drawing/2014/main" id="{1AA7C77D-69C9-0CDE-B74B-BCFAB56A972B}"/>
+              </a:ext>
+            </a:extLst>
+          </p:cNvPr>
+          <p:cNvSpPr txBox="1"/>
+          <p:nvPr/>
+        </p:nvSpPr>
+        <p:spPr>
+          <a:xfrm>
+            <a:off x="407147" y="5853981"/>
+            <a:ext cx="11551471" cy="646331"/>
+          </a:xfrm>
+          <a:prstGeom prst="rect">
+            <a:avLst/>
+          </a:prstGeom>
+          <a:noFill/>
+        </p:spPr>
+        <p:txBody>
+          <a:bodyPr wrap="square" rtlCol="0">
+            <a:spAutoFit/>
+          </a:bodyPr>
+          <a:lstStyle/>
+          <a:p>
+            <a:r>
+              <a:rPr lang="en-US" dirty="0"/>
+              <a:t>The distribution of ABV is right skewed, meaning there are a few beers with very high alcohol contents increasing the mean ABV compared to the median ABV.</a:t>
+            </a:r>
+          </a:p>
+        </p:txBody>
+      </p:sp>
+    </p:spTree>
+    <p:extLst>
+      <p:ext uri="{BB962C8B-B14F-4D97-AF65-F5344CB8AC3E}">
+        <p14:creationId xmlns:p14="http://schemas.microsoft.com/office/powerpoint/2010/main" val="70656840"/>
+      </p:ext>
+    </p:extLst>
+  </p:cSld>
+  <p:clrMapOvr>
+    <a:masterClrMapping/>
+  </p:clrMapOvr>
+</p:sld>
+</file>
+
 <file path=ppt/theme/theme1.xml><?xml version="1.0" encoding="utf-8"?>
 <a:theme xmlns:a="http://schemas.openxmlformats.org/drawingml/2006/main" name="Office Theme">
   <a:themeElements>

</xml_diff>